<commit_message>
modify webpage & finish Design ppt
</commit_message>
<xml_diff>
--- a/M_RWD_Design_傅意茹.pptx
+++ b/M_RWD_Design_傅意茹.pptx
@@ -288,7 +288,7 @@
           <a:p>
             <a:fld id="{58B3F3ED-7A63-6541-B692-78FDCC0CB9E1}" type="datetimeFigureOut">
               <a:rPr kumimoji="1" lang="zh-TW" altLang="en-US" smtClean="0"/>
-              <a:t>2016/5/18</a:t>
+              <a:t>2016/5/22</a:t>
             </a:fld>
             <a:endParaRPr kumimoji="1" lang="zh-TW" altLang="en-US"/>
           </a:p>
@@ -458,7 +458,7 @@
           <a:p>
             <a:fld id="{58B3F3ED-7A63-6541-B692-78FDCC0CB9E1}" type="datetimeFigureOut">
               <a:rPr kumimoji="1" lang="zh-TW" altLang="en-US" smtClean="0"/>
-              <a:t>2016/5/18</a:t>
+              <a:t>2016/5/22</a:t>
             </a:fld>
             <a:endParaRPr kumimoji="1" lang="zh-TW" altLang="en-US"/>
           </a:p>
@@ -638,7 +638,7 @@
           <a:p>
             <a:fld id="{58B3F3ED-7A63-6541-B692-78FDCC0CB9E1}" type="datetimeFigureOut">
               <a:rPr kumimoji="1" lang="zh-TW" altLang="en-US" smtClean="0"/>
-              <a:t>2016/5/18</a:t>
+              <a:t>2016/5/22</a:t>
             </a:fld>
             <a:endParaRPr kumimoji="1" lang="zh-TW" altLang="en-US"/>
           </a:p>
@@ -808,7 +808,7 @@
           <a:p>
             <a:fld id="{58B3F3ED-7A63-6541-B692-78FDCC0CB9E1}" type="datetimeFigureOut">
               <a:rPr kumimoji="1" lang="zh-TW" altLang="en-US" smtClean="0"/>
-              <a:t>2016/5/18</a:t>
+              <a:t>2016/5/22</a:t>
             </a:fld>
             <a:endParaRPr kumimoji="1" lang="zh-TW" altLang="en-US"/>
           </a:p>
@@ -1054,7 +1054,7 @@
           <a:p>
             <a:fld id="{58B3F3ED-7A63-6541-B692-78FDCC0CB9E1}" type="datetimeFigureOut">
               <a:rPr kumimoji="1" lang="zh-TW" altLang="en-US" smtClean="0"/>
-              <a:t>2016/5/18</a:t>
+              <a:t>2016/5/22</a:t>
             </a:fld>
             <a:endParaRPr kumimoji="1" lang="zh-TW" altLang="en-US"/>
           </a:p>
@@ -1342,7 +1342,7 @@
           <a:p>
             <a:fld id="{58B3F3ED-7A63-6541-B692-78FDCC0CB9E1}" type="datetimeFigureOut">
               <a:rPr kumimoji="1" lang="zh-TW" altLang="en-US" smtClean="0"/>
-              <a:t>2016/5/18</a:t>
+              <a:t>2016/5/22</a:t>
             </a:fld>
             <a:endParaRPr kumimoji="1" lang="zh-TW" altLang="en-US"/>
           </a:p>
@@ -1769,7 +1769,7 @@
           <a:p>
             <a:fld id="{58B3F3ED-7A63-6541-B692-78FDCC0CB9E1}" type="datetimeFigureOut">
               <a:rPr kumimoji="1" lang="zh-TW" altLang="en-US" smtClean="0"/>
-              <a:t>2016/5/18</a:t>
+              <a:t>2016/5/22</a:t>
             </a:fld>
             <a:endParaRPr kumimoji="1" lang="zh-TW" altLang="en-US"/>
           </a:p>
@@ -1887,7 +1887,7 @@
           <a:p>
             <a:fld id="{58B3F3ED-7A63-6541-B692-78FDCC0CB9E1}" type="datetimeFigureOut">
               <a:rPr kumimoji="1" lang="zh-TW" altLang="en-US" smtClean="0"/>
-              <a:t>2016/5/18</a:t>
+              <a:t>2016/5/22</a:t>
             </a:fld>
             <a:endParaRPr kumimoji="1" lang="zh-TW" altLang="en-US"/>
           </a:p>
@@ -1982,7 +1982,7 @@
           <a:p>
             <a:fld id="{58B3F3ED-7A63-6541-B692-78FDCC0CB9E1}" type="datetimeFigureOut">
               <a:rPr kumimoji="1" lang="zh-TW" altLang="en-US" smtClean="0"/>
-              <a:t>2016/5/18</a:t>
+              <a:t>2016/5/22</a:t>
             </a:fld>
             <a:endParaRPr kumimoji="1" lang="zh-TW" altLang="en-US"/>
           </a:p>
@@ -2259,7 +2259,7 @@
           <a:p>
             <a:fld id="{58B3F3ED-7A63-6541-B692-78FDCC0CB9E1}" type="datetimeFigureOut">
               <a:rPr kumimoji="1" lang="zh-TW" altLang="en-US" smtClean="0"/>
-              <a:t>2016/5/18</a:t>
+              <a:t>2016/5/22</a:t>
             </a:fld>
             <a:endParaRPr kumimoji="1" lang="zh-TW" altLang="en-US"/>
           </a:p>
@@ -2512,7 +2512,7 @@
           <a:p>
             <a:fld id="{58B3F3ED-7A63-6541-B692-78FDCC0CB9E1}" type="datetimeFigureOut">
               <a:rPr kumimoji="1" lang="zh-TW" altLang="en-US" smtClean="0"/>
-              <a:t>2016/5/18</a:t>
+              <a:t>2016/5/22</a:t>
             </a:fld>
             <a:endParaRPr kumimoji="1" lang="zh-TW" altLang="en-US"/>
           </a:p>
@@ -2725,7 +2725,7 @@
           <a:p>
             <a:fld id="{58B3F3ED-7A63-6541-B692-78FDCC0CB9E1}" type="datetimeFigureOut">
               <a:rPr kumimoji="1" lang="zh-TW" altLang="en-US" smtClean="0"/>
-              <a:t>2016/5/18</a:t>
+              <a:t>2016/5/22</a:t>
             </a:fld>
             <a:endParaRPr kumimoji="1" lang="zh-TW" altLang="en-US"/>
           </a:p>
@@ -3662,630 +3662,690 @@
           </a:p>
         </p:txBody>
       </p:sp>
-      <p:pic>
-        <p:nvPicPr>
-          <p:cNvPr id="75" name="圖片 74" descr="garden-dog-pet.jpg"/>
-          <p:cNvPicPr>
-            <a:picLocks noChangeAspect="1"/>
-          </p:cNvPicPr>
+      <p:grpSp>
+        <p:nvGrpSpPr>
+          <p:cNvPr id="5" name="群組 4"/>
+          <p:cNvGrpSpPr/>
           <p:nvPr/>
-        </p:nvPicPr>
-        <p:blipFill rotWithShape="1">
-          <a:blip r:embed="rId6" cstate="email">
-            <a:extLst>
-              <a:ext uri="{28A0092B-C50C-407E-A947-70E740481C1C}">
-                <a14:useLocalDpi xmlns:a14="http://schemas.microsoft.com/office/drawing/2010/main"/>
-              </a:ext>
-            </a:extLst>
-          </a:blip>
-          <a:srcRect/>
-          <a:stretch/>
-        </p:blipFill>
-        <p:spPr>
+        </p:nvGrpSpPr>
+        <p:grpSpPr>
           <a:xfrm>
-            <a:off x="127059" y="6052812"/>
-            <a:ext cx="939348" cy="900000"/>
+            <a:off x="127063" y="2688986"/>
+            <a:ext cx="3353538" cy="946191"/>
+            <a:chOff x="127063" y="2688986"/>
+            <a:chExt cx="3353538" cy="946191"/>
           </a:xfrm>
-          <a:prstGeom prst="rect">
-            <a:avLst/>
-          </a:prstGeom>
-        </p:spPr>
-      </p:pic>
-      <p:pic>
-        <p:nvPicPr>
-          <p:cNvPr id="76" name="圖片 75" descr="pexels-photo2.jpg"/>
-          <p:cNvPicPr>
-            <a:picLocks noChangeAspect="1"/>
-          </p:cNvPicPr>
-          <p:nvPr/>
-        </p:nvPicPr>
-        <p:blipFill rotWithShape="1">
-          <a:blip r:embed="rId7" cstate="email">
-            <a:extLst>
-              <a:ext uri="{28A0092B-C50C-407E-A947-70E740481C1C}">
-                <a14:useLocalDpi xmlns:a14="http://schemas.microsoft.com/office/drawing/2010/main"/>
-              </a:ext>
-            </a:extLst>
-          </a:blip>
-          <a:srcRect/>
-          <a:stretch/>
-        </p:blipFill>
-        <p:spPr>
-          <a:xfrm>
-            <a:off x="127063" y="4946933"/>
-            <a:ext cx="932393" cy="900000"/>
-          </a:xfrm>
-          <a:prstGeom prst="rect">
-            <a:avLst/>
-          </a:prstGeom>
-        </p:spPr>
-      </p:pic>
-      <p:pic>
-        <p:nvPicPr>
-          <p:cNvPr id="77" name="圖片 76" descr="pexels-photo-51439.jpg"/>
-          <p:cNvPicPr>
-            <a:picLocks noChangeAspect="1"/>
-          </p:cNvPicPr>
-          <p:nvPr/>
-        </p:nvPicPr>
-        <p:blipFill rotWithShape="1">
-          <a:blip r:embed="rId8" cstate="email">
-            <a:extLst>
-              <a:ext uri="{28A0092B-C50C-407E-A947-70E740481C1C}">
-                <a14:useLocalDpi xmlns:a14="http://schemas.microsoft.com/office/drawing/2010/main"/>
-              </a:ext>
-            </a:extLst>
-          </a:blip>
-          <a:srcRect/>
-          <a:stretch/>
-        </p:blipFill>
-        <p:spPr>
-          <a:xfrm>
-            <a:off x="127063" y="3841055"/>
-            <a:ext cx="933531" cy="900000"/>
-          </a:xfrm>
-          <a:prstGeom prst="rect">
-            <a:avLst/>
-          </a:prstGeom>
-        </p:spPr>
-      </p:pic>
-      <p:pic>
-        <p:nvPicPr>
-          <p:cNvPr id="78" name="圖片 77" descr="pexels-photo.jpg"/>
-          <p:cNvPicPr>
-            <a:picLocks noChangeAspect="1"/>
-          </p:cNvPicPr>
-          <p:nvPr/>
-        </p:nvPicPr>
-        <p:blipFill rotWithShape="1">
-          <a:blip r:embed="rId9" cstate="email">
-            <a:extLst>
-              <a:ext uri="{28A0092B-C50C-407E-A947-70E740481C1C}">
-                <a14:useLocalDpi xmlns:a14="http://schemas.microsoft.com/office/drawing/2010/main"/>
-              </a:ext>
-            </a:extLst>
-          </a:blip>
-          <a:srcRect/>
-          <a:stretch/>
-        </p:blipFill>
-        <p:spPr>
-          <a:xfrm>
-            <a:off x="127063" y="2735177"/>
-            <a:ext cx="932393" cy="900000"/>
-          </a:xfrm>
-          <a:prstGeom prst="rect">
-            <a:avLst/>
-          </a:prstGeom>
-        </p:spPr>
-      </p:pic>
-      <p:sp>
-        <p:nvSpPr>
-          <p:cNvPr id="79" name="文字方塊 78"/>
-          <p:cNvSpPr txBox="1"/>
-          <p:nvPr/>
-        </p:nvSpPr>
-        <p:spPr>
-          <a:xfrm>
-            <a:off x="1066070" y="2688986"/>
-            <a:ext cx="944011" cy="307777"/>
-          </a:xfrm>
-          <a:prstGeom prst="rect">
-            <a:avLst/>
-          </a:prstGeom>
-          <a:noFill/>
-        </p:spPr>
-        <p:txBody>
-          <a:bodyPr wrap="square" rtlCol="0">
-            <a:spAutoFit/>
-          </a:bodyPr>
-          <a:lstStyle/>
-          <a:p>
-            <a:r>
-              <a:rPr kumimoji="1" lang="en-US" altLang="zh-TW" sz="1400" b="1" dirty="0" smtClean="0">
+        </p:grpSpPr>
+        <p:pic>
+          <p:nvPicPr>
+            <p:cNvPr id="78" name="圖片 77" descr="pexels-photo.jpg"/>
+            <p:cNvPicPr>
+              <a:picLocks noChangeAspect="1"/>
+            </p:cNvPicPr>
+            <p:nvPr/>
+          </p:nvPicPr>
+          <p:blipFill rotWithShape="1">
+            <a:blip r:embed="rId6" cstate="email">
+              <a:extLst>
+                <a:ext uri="{28A0092B-C50C-407E-A947-70E740481C1C}">
+                  <a14:useLocalDpi xmlns:a14="http://schemas.microsoft.com/office/drawing/2010/main"/>
+                </a:ext>
+              </a:extLst>
+            </a:blip>
+            <a:srcRect/>
+            <a:stretch/>
+          </p:blipFill>
+          <p:spPr>
+            <a:xfrm>
+              <a:off x="127063" y="2735177"/>
+              <a:ext cx="932393" cy="900000"/>
+            </a:xfrm>
+            <a:prstGeom prst="rect">
+              <a:avLst/>
+            </a:prstGeom>
+          </p:spPr>
+        </p:pic>
+        <p:sp>
+          <p:nvSpPr>
+            <p:cNvPr id="79" name="文字方塊 78"/>
+            <p:cNvSpPr txBox="1"/>
+            <p:nvPr/>
+          </p:nvSpPr>
+          <p:spPr>
+            <a:xfrm>
+              <a:off x="1066070" y="2688986"/>
+              <a:ext cx="944011" cy="307777"/>
+            </a:xfrm>
+            <a:prstGeom prst="rect">
+              <a:avLst/>
+            </a:prstGeom>
+            <a:noFill/>
+          </p:spPr>
+          <p:txBody>
+            <a:bodyPr wrap="square" rtlCol="0">
+              <a:spAutoFit/>
+            </a:bodyPr>
+            <a:lstStyle/>
+            <a:p>
+              <a:r>
+                <a:rPr kumimoji="1" lang="en-US" altLang="zh-TW" sz="1400" b="1" dirty="0" smtClean="0">
+                  <a:solidFill>
+                    <a:srgbClr val="663333"/>
+                  </a:solidFill>
+                  <a:latin typeface="SFNS Display"/>
+                  <a:cs typeface="SFNS Display"/>
+                </a:rPr>
+                <a:t>KING</a:t>
+              </a:r>
+              <a:endParaRPr kumimoji="1" lang="zh-TW" altLang="en-US" sz="1400" b="1" dirty="0">
                 <a:solidFill>
                   <a:srgbClr val="663333"/>
                 </a:solidFill>
                 <a:latin typeface="SFNS Display"/>
                 <a:cs typeface="SFNS Display"/>
-              </a:rPr>
-              <a:t>KING</a:t>
-            </a:r>
-            <a:endParaRPr kumimoji="1" lang="zh-TW" altLang="en-US" sz="1400" b="1" dirty="0">
-              <a:solidFill>
-                <a:srgbClr val="663333"/>
-              </a:solidFill>
-              <a:latin typeface="SFNS Display"/>
-              <a:cs typeface="SFNS Display"/>
-            </a:endParaRPr>
-          </a:p>
-        </p:txBody>
-      </p:sp>
-      <p:sp>
-        <p:nvSpPr>
-          <p:cNvPr id="80" name="文字方塊 79"/>
-          <p:cNvSpPr txBox="1"/>
-          <p:nvPr/>
-        </p:nvSpPr>
-        <p:spPr>
-          <a:xfrm>
-            <a:off x="1066066" y="2924005"/>
-            <a:ext cx="1051650" cy="230832"/>
-          </a:xfrm>
-          <a:prstGeom prst="rect">
-            <a:avLst/>
-          </a:prstGeom>
-          <a:noFill/>
-        </p:spPr>
-        <p:txBody>
-          <a:bodyPr wrap="square" rtlCol="0">
-            <a:spAutoFit/>
-          </a:bodyPr>
-          <a:lstStyle/>
-          <a:p>
-            <a:pPr latinLnBrk="1"/>
-            <a:r>
-              <a:rPr kumimoji="1" lang="en-US" altLang="zh-TW" sz="900" i="1" dirty="0" smtClean="0">
+              </a:endParaRPr>
+            </a:p>
+          </p:txBody>
+        </p:sp>
+        <p:sp>
+          <p:nvSpPr>
+            <p:cNvPr id="80" name="文字方塊 79"/>
+            <p:cNvSpPr txBox="1"/>
+            <p:nvPr/>
+          </p:nvSpPr>
+          <p:spPr>
+            <a:xfrm>
+              <a:off x="1066066" y="2924005"/>
+              <a:ext cx="1051650" cy="230832"/>
+            </a:xfrm>
+            <a:prstGeom prst="rect">
+              <a:avLst/>
+            </a:prstGeom>
+            <a:noFill/>
+          </p:spPr>
+          <p:txBody>
+            <a:bodyPr wrap="square" rtlCol="0">
+              <a:spAutoFit/>
+            </a:bodyPr>
+            <a:lstStyle/>
+            <a:p>
+              <a:pPr latinLnBrk="1"/>
+              <a:r>
+                <a:rPr kumimoji="1" lang="en-US" altLang="zh-TW" sz="900" i="1" dirty="0" smtClean="0">
+                  <a:solidFill>
+                    <a:srgbClr val="943F43"/>
+                  </a:solidFill>
+                  <a:latin typeface="SFNS Display"/>
+                  <a:cs typeface="SFNS Display"/>
+                </a:rPr>
+                <a:t>British Shorthair</a:t>
+              </a:r>
+              <a:endParaRPr kumimoji="1" lang="zh-TW" altLang="en-US" sz="900" i="1" dirty="0">
                 <a:solidFill>
                   <a:srgbClr val="943F43"/>
                 </a:solidFill>
                 <a:latin typeface="SFNS Display"/>
                 <a:cs typeface="SFNS Display"/>
-              </a:rPr>
-              <a:t>British Shorthair</a:t>
-            </a:r>
-            <a:endParaRPr kumimoji="1" lang="zh-TW" altLang="en-US" sz="900" i="1" dirty="0">
-              <a:solidFill>
-                <a:srgbClr val="943F43"/>
-              </a:solidFill>
-              <a:latin typeface="SFNS Display"/>
-              <a:cs typeface="SFNS Display"/>
-            </a:endParaRPr>
-          </a:p>
-        </p:txBody>
-      </p:sp>
-      <p:sp>
-        <p:nvSpPr>
-          <p:cNvPr id="112" name="文字方塊 111"/>
-          <p:cNvSpPr txBox="1"/>
-          <p:nvPr/>
-        </p:nvSpPr>
-        <p:spPr>
-          <a:xfrm>
-            <a:off x="1066070" y="3133103"/>
-            <a:ext cx="2414531" cy="400110"/>
-          </a:xfrm>
-          <a:prstGeom prst="rect">
-            <a:avLst/>
-          </a:prstGeom>
-          <a:noFill/>
-        </p:spPr>
-        <p:txBody>
-          <a:bodyPr wrap="square" rtlCol="0">
-            <a:spAutoFit/>
-          </a:bodyPr>
-          <a:lstStyle/>
-          <a:p>
-            <a:r>
-              <a:rPr kumimoji="1" lang="en-US" altLang="zh-TW" sz="1000" dirty="0" smtClean="0">
+              </a:endParaRPr>
+            </a:p>
+          </p:txBody>
+        </p:sp>
+        <p:sp>
+          <p:nvSpPr>
+            <p:cNvPr id="112" name="文字方塊 111"/>
+            <p:cNvSpPr txBox="1"/>
+            <p:nvPr/>
+          </p:nvSpPr>
+          <p:spPr>
+            <a:xfrm>
+              <a:off x="1066070" y="3133103"/>
+              <a:ext cx="2414531" cy="400110"/>
+            </a:xfrm>
+            <a:prstGeom prst="rect">
+              <a:avLst/>
+            </a:prstGeom>
+            <a:noFill/>
+          </p:spPr>
+          <p:txBody>
+            <a:bodyPr wrap="square" rtlCol="0">
+              <a:spAutoFit/>
+            </a:bodyPr>
+            <a:lstStyle/>
+            <a:p>
+              <a:r>
+                <a:rPr kumimoji="1" lang="en-US" altLang="zh-TW" sz="1000" dirty="0" smtClean="0">
+                  <a:solidFill>
+                    <a:srgbClr val="666663"/>
+                  </a:solidFill>
+                  <a:latin typeface="SFNS Display"/>
+                  <a:cs typeface="SFNS Display"/>
+                </a:rPr>
+                <a:t>Check out this primer so you can meet and understand your dog’s needs.</a:t>
+              </a:r>
+              <a:endParaRPr kumimoji="1" lang="zh-TW" altLang="en-US" sz="1000" dirty="0">
                 <a:solidFill>
                   <a:srgbClr val="666663"/>
                 </a:solidFill>
                 <a:latin typeface="SFNS Display"/>
                 <a:cs typeface="SFNS Display"/>
-              </a:rPr>
-              <a:t>Check out this primer so you can meet and understand your dog’s needs.</a:t>
-            </a:r>
-            <a:endParaRPr kumimoji="1" lang="zh-TW" altLang="en-US" sz="1000" dirty="0">
-              <a:solidFill>
-                <a:srgbClr val="666663"/>
-              </a:solidFill>
-              <a:latin typeface="SFNS Display"/>
-              <a:cs typeface="SFNS Display"/>
-            </a:endParaRPr>
-          </a:p>
-        </p:txBody>
-      </p:sp>
-      <p:sp>
-        <p:nvSpPr>
-          <p:cNvPr id="113" name="文字方塊 112"/>
-          <p:cNvSpPr txBox="1"/>
+              </a:endParaRPr>
+            </a:p>
+          </p:txBody>
+        </p:sp>
+      </p:grpSp>
+      <p:grpSp>
+        <p:nvGrpSpPr>
+          <p:cNvPr id="2" name="群組 1"/>
+          <p:cNvGrpSpPr/>
           <p:nvPr/>
-        </p:nvSpPr>
-        <p:spPr>
+        </p:nvGrpSpPr>
+        <p:grpSpPr>
           <a:xfrm>
-            <a:off x="1070937" y="3794863"/>
-            <a:ext cx="944011" cy="307777"/>
+            <a:off x="130306" y="4900742"/>
+            <a:ext cx="3358405" cy="946192"/>
+            <a:chOff x="127063" y="3794863"/>
+            <a:chExt cx="3358405" cy="946192"/>
           </a:xfrm>
-          <a:prstGeom prst="rect">
-            <a:avLst/>
-          </a:prstGeom>
-          <a:noFill/>
-        </p:spPr>
-        <p:txBody>
-          <a:bodyPr wrap="square" rtlCol="0">
-            <a:spAutoFit/>
-          </a:bodyPr>
-          <a:lstStyle/>
-          <a:p>
-            <a:r>
-              <a:rPr kumimoji="1" lang="en-US" altLang="zh-TW" sz="1400" b="1" dirty="0" smtClean="0">
+        </p:grpSpPr>
+        <p:pic>
+          <p:nvPicPr>
+            <p:cNvPr id="77" name="圖片 76" descr="pexels-photo-51439.jpg"/>
+            <p:cNvPicPr>
+              <a:picLocks noChangeAspect="1"/>
+            </p:cNvPicPr>
+            <p:nvPr/>
+          </p:nvPicPr>
+          <p:blipFill rotWithShape="1">
+            <a:blip r:embed="rId7" cstate="email">
+              <a:extLst>
+                <a:ext uri="{28A0092B-C50C-407E-A947-70E740481C1C}">
+                  <a14:useLocalDpi xmlns:a14="http://schemas.microsoft.com/office/drawing/2010/main"/>
+                </a:ext>
+              </a:extLst>
+            </a:blip>
+            <a:srcRect/>
+            <a:stretch/>
+          </p:blipFill>
+          <p:spPr>
+            <a:xfrm>
+              <a:off x="127063" y="3841055"/>
+              <a:ext cx="933531" cy="900000"/>
+            </a:xfrm>
+            <a:prstGeom prst="rect">
+              <a:avLst/>
+            </a:prstGeom>
+          </p:spPr>
+        </p:pic>
+        <p:sp>
+          <p:nvSpPr>
+            <p:cNvPr id="113" name="文字方塊 112"/>
+            <p:cNvSpPr txBox="1"/>
+            <p:nvPr/>
+          </p:nvSpPr>
+          <p:spPr>
+            <a:xfrm>
+              <a:off x="1070937" y="3794863"/>
+              <a:ext cx="944011" cy="307777"/>
+            </a:xfrm>
+            <a:prstGeom prst="rect">
+              <a:avLst/>
+            </a:prstGeom>
+            <a:noFill/>
+          </p:spPr>
+          <p:txBody>
+            <a:bodyPr wrap="square" rtlCol="0">
+              <a:spAutoFit/>
+            </a:bodyPr>
+            <a:lstStyle/>
+            <a:p>
+              <a:r>
+                <a:rPr kumimoji="1" lang="en-US" altLang="zh-TW" sz="1400" b="1" dirty="0" smtClean="0">
+                  <a:solidFill>
+                    <a:srgbClr val="663333"/>
+                  </a:solidFill>
+                  <a:latin typeface="SFNS Display"/>
+                  <a:cs typeface="SFNS Display"/>
+                </a:rPr>
+                <a:t>Cathy</a:t>
+              </a:r>
+              <a:endParaRPr kumimoji="1" lang="zh-TW" altLang="en-US" sz="1400" b="1" dirty="0">
                 <a:solidFill>
                   <a:srgbClr val="663333"/>
                 </a:solidFill>
                 <a:latin typeface="SFNS Display"/>
                 <a:cs typeface="SFNS Display"/>
-              </a:rPr>
-              <a:t>Cathy</a:t>
-            </a:r>
-            <a:endParaRPr kumimoji="1" lang="zh-TW" altLang="en-US" sz="1400" b="1" dirty="0">
-              <a:solidFill>
-                <a:srgbClr val="663333"/>
-              </a:solidFill>
-              <a:latin typeface="SFNS Display"/>
-              <a:cs typeface="SFNS Display"/>
-            </a:endParaRPr>
-          </a:p>
-        </p:txBody>
-      </p:sp>
-      <p:sp>
-        <p:nvSpPr>
-          <p:cNvPr id="114" name="文字方塊 113"/>
-          <p:cNvSpPr txBox="1"/>
-          <p:nvPr/>
-        </p:nvSpPr>
-        <p:spPr>
-          <a:xfrm>
-            <a:off x="1070933" y="4029883"/>
-            <a:ext cx="1051650" cy="230832"/>
-          </a:xfrm>
-          <a:prstGeom prst="rect">
-            <a:avLst/>
-          </a:prstGeom>
-          <a:noFill/>
-        </p:spPr>
-        <p:txBody>
-          <a:bodyPr wrap="square" rtlCol="0">
-            <a:spAutoFit/>
-          </a:bodyPr>
-          <a:lstStyle/>
-          <a:p>
-            <a:pPr latinLnBrk="1"/>
-            <a:r>
-              <a:rPr kumimoji="1" lang="en-US" altLang="zh-TW" sz="900" i="1" dirty="0" smtClean="0">
+              </a:endParaRPr>
+            </a:p>
+          </p:txBody>
+        </p:sp>
+        <p:sp>
+          <p:nvSpPr>
+            <p:cNvPr id="114" name="文字方塊 113"/>
+            <p:cNvSpPr txBox="1"/>
+            <p:nvPr/>
+          </p:nvSpPr>
+          <p:spPr>
+            <a:xfrm>
+              <a:off x="1070933" y="4029883"/>
+              <a:ext cx="1051650" cy="230832"/>
+            </a:xfrm>
+            <a:prstGeom prst="rect">
+              <a:avLst/>
+            </a:prstGeom>
+            <a:noFill/>
+          </p:spPr>
+          <p:txBody>
+            <a:bodyPr wrap="square" rtlCol="0">
+              <a:spAutoFit/>
+            </a:bodyPr>
+            <a:lstStyle/>
+            <a:p>
+              <a:pPr latinLnBrk="1"/>
+              <a:r>
+                <a:rPr kumimoji="1" lang="en-US" altLang="zh-TW" sz="900" i="1" dirty="0" smtClean="0">
+                  <a:solidFill>
+                    <a:srgbClr val="943F43"/>
+                  </a:solidFill>
+                  <a:latin typeface="SFNS Display"/>
+                  <a:cs typeface="SFNS Display"/>
+                </a:rPr>
+                <a:t>British Shorthair</a:t>
+              </a:r>
+              <a:endParaRPr kumimoji="1" lang="zh-TW" altLang="en-US" sz="900" i="1" dirty="0">
                 <a:solidFill>
                   <a:srgbClr val="943F43"/>
                 </a:solidFill>
                 <a:latin typeface="SFNS Display"/>
                 <a:cs typeface="SFNS Display"/>
-              </a:rPr>
-              <a:t>British Shorthair</a:t>
-            </a:r>
-            <a:endParaRPr kumimoji="1" lang="zh-TW" altLang="en-US" sz="900" i="1" dirty="0">
-              <a:solidFill>
-                <a:srgbClr val="943F43"/>
-              </a:solidFill>
-              <a:latin typeface="SFNS Display"/>
-              <a:cs typeface="SFNS Display"/>
-            </a:endParaRPr>
-          </a:p>
-        </p:txBody>
-      </p:sp>
-      <p:sp>
-        <p:nvSpPr>
-          <p:cNvPr id="115" name="文字方塊 114"/>
-          <p:cNvSpPr txBox="1"/>
-          <p:nvPr/>
-        </p:nvSpPr>
-        <p:spPr>
-          <a:xfrm>
-            <a:off x="1070937" y="4238981"/>
-            <a:ext cx="2414531" cy="400110"/>
-          </a:xfrm>
-          <a:prstGeom prst="rect">
-            <a:avLst/>
-          </a:prstGeom>
-          <a:noFill/>
-        </p:spPr>
-        <p:txBody>
-          <a:bodyPr wrap="square" rtlCol="0">
-            <a:spAutoFit/>
-          </a:bodyPr>
-          <a:lstStyle/>
-          <a:p>
-            <a:r>
-              <a:rPr kumimoji="1" lang="en-US" altLang="zh-TW" sz="1000" dirty="0" smtClean="0">
+              </a:endParaRPr>
+            </a:p>
+          </p:txBody>
+        </p:sp>
+        <p:sp>
+          <p:nvSpPr>
+            <p:cNvPr id="115" name="文字方塊 114"/>
+            <p:cNvSpPr txBox="1"/>
+            <p:nvPr/>
+          </p:nvSpPr>
+          <p:spPr>
+            <a:xfrm>
+              <a:off x="1070937" y="4238981"/>
+              <a:ext cx="2414531" cy="400110"/>
+            </a:xfrm>
+            <a:prstGeom prst="rect">
+              <a:avLst/>
+            </a:prstGeom>
+            <a:noFill/>
+          </p:spPr>
+          <p:txBody>
+            <a:bodyPr wrap="square" rtlCol="0">
+              <a:spAutoFit/>
+            </a:bodyPr>
+            <a:lstStyle/>
+            <a:p>
+              <a:r>
+                <a:rPr kumimoji="1" lang="en-US" altLang="zh-TW" sz="1000" dirty="0" smtClean="0">
+                  <a:solidFill>
+                    <a:srgbClr val="666663"/>
+                  </a:solidFill>
+                  <a:latin typeface="SFNS Display"/>
+                  <a:cs typeface="SFNS Display"/>
+                </a:rPr>
+                <a:t>Check out this primer so you can meet and understand your dog’s needs.</a:t>
+              </a:r>
+              <a:endParaRPr kumimoji="1" lang="zh-TW" altLang="en-US" sz="1000" dirty="0">
                 <a:solidFill>
                   <a:srgbClr val="666663"/>
                 </a:solidFill>
                 <a:latin typeface="SFNS Display"/>
                 <a:cs typeface="SFNS Display"/>
-              </a:rPr>
-              <a:t>Check out this primer so you can meet and understand your dog’s needs.</a:t>
-            </a:r>
-            <a:endParaRPr kumimoji="1" lang="zh-TW" altLang="en-US" sz="1000" dirty="0">
-              <a:solidFill>
-                <a:srgbClr val="666663"/>
-              </a:solidFill>
-              <a:latin typeface="SFNS Display"/>
-              <a:cs typeface="SFNS Display"/>
-            </a:endParaRPr>
-          </a:p>
-        </p:txBody>
-      </p:sp>
-      <p:sp>
-        <p:nvSpPr>
-          <p:cNvPr id="116" name="文字方塊 115"/>
-          <p:cNvSpPr txBox="1"/>
+              </a:endParaRPr>
+            </a:p>
+          </p:txBody>
+        </p:sp>
+      </p:grpSp>
+      <p:grpSp>
+        <p:nvGrpSpPr>
+          <p:cNvPr id="4" name="群組 3"/>
+          <p:cNvGrpSpPr/>
           <p:nvPr/>
-        </p:nvSpPr>
-        <p:spPr>
+        </p:nvGrpSpPr>
+        <p:grpSpPr>
           <a:xfrm>
-            <a:off x="1070937" y="4900742"/>
-            <a:ext cx="944011" cy="307777"/>
+            <a:off x="127063" y="3794864"/>
+            <a:ext cx="3358405" cy="946191"/>
+            <a:chOff x="127063" y="4900742"/>
+            <a:chExt cx="3358405" cy="946191"/>
           </a:xfrm>
-          <a:prstGeom prst="rect">
-            <a:avLst/>
-          </a:prstGeom>
-          <a:noFill/>
-        </p:spPr>
-        <p:txBody>
-          <a:bodyPr wrap="square" rtlCol="0">
-            <a:spAutoFit/>
-          </a:bodyPr>
-          <a:lstStyle/>
-          <a:p>
-            <a:r>
-              <a:rPr kumimoji="1" lang="en-US" altLang="zh-TW" sz="1400" b="1" dirty="0" smtClean="0">
+        </p:grpSpPr>
+        <p:pic>
+          <p:nvPicPr>
+            <p:cNvPr id="76" name="圖片 75" descr="pexels-photo2.jpg"/>
+            <p:cNvPicPr>
+              <a:picLocks noChangeAspect="1"/>
+            </p:cNvPicPr>
+            <p:nvPr/>
+          </p:nvPicPr>
+          <p:blipFill rotWithShape="1">
+            <a:blip r:embed="rId8" cstate="email">
+              <a:extLst>
+                <a:ext uri="{28A0092B-C50C-407E-A947-70E740481C1C}">
+                  <a14:useLocalDpi xmlns:a14="http://schemas.microsoft.com/office/drawing/2010/main"/>
+                </a:ext>
+              </a:extLst>
+            </a:blip>
+            <a:srcRect/>
+            <a:stretch/>
+          </p:blipFill>
+          <p:spPr>
+            <a:xfrm>
+              <a:off x="127063" y="4946933"/>
+              <a:ext cx="932393" cy="900000"/>
+            </a:xfrm>
+            <a:prstGeom prst="rect">
+              <a:avLst/>
+            </a:prstGeom>
+          </p:spPr>
+        </p:pic>
+        <p:sp>
+          <p:nvSpPr>
+            <p:cNvPr id="116" name="文字方塊 115"/>
+            <p:cNvSpPr txBox="1"/>
+            <p:nvPr/>
+          </p:nvSpPr>
+          <p:spPr>
+            <a:xfrm>
+              <a:off x="1070937" y="4900742"/>
+              <a:ext cx="944011" cy="307777"/>
+            </a:xfrm>
+            <a:prstGeom prst="rect">
+              <a:avLst/>
+            </a:prstGeom>
+            <a:noFill/>
+          </p:spPr>
+          <p:txBody>
+            <a:bodyPr wrap="square" rtlCol="0">
+              <a:spAutoFit/>
+            </a:bodyPr>
+            <a:lstStyle/>
+            <a:p>
+              <a:r>
+                <a:rPr kumimoji="1" lang="en-US" altLang="zh-TW" sz="1400" b="1" dirty="0" smtClean="0">
+                  <a:solidFill>
+                    <a:srgbClr val="663333"/>
+                  </a:solidFill>
+                  <a:latin typeface="SFNS Display"/>
+                  <a:cs typeface="SFNS Display"/>
+                </a:rPr>
+                <a:t>Happy</a:t>
+              </a:r>
+              <a:endParaRPr kumimoji="1" lang="zh-TW" altLang="en-US" sz="1400" b="1" dirty="0">
                 <a:solidFill>
                   <a:srgbClr val="663333"/>
                 </a:solidFill>
                 <a:latin typeface="SFNS Display"/>
                 <a:cs typeface="SFNS Display"/>
-              </a:rPr>
-              <a:t>Happy</a:t>
-            </a:r>
-            <a:endParaRPr kumimoji="1" lang="zh-TW" altLang="en-US" sz="1400" b="1" dirty="0">
-              <a:solidFill>
-                <a:srgbClr val="663333"/>
-              </a:solidFill>
-              <a:latin typeface="SFNS Display"/>
-              <a:cs typeface="SFNS Display"/>
-            </a:endParaRPr>
-          </a:p>
-        </p:txBody>
-      </p:sp>
-      <p:sp>
-        <p:nvSpPr>
-          <p:cNvPr id="117" name="文字方塊 116"/>
-          <p:cNvSpPr txBox="1"/>
-          <p:nvPr/>
-        </p:nvSpPr>
-        <p:spPr>
-          <a:xfrm>
-            <a:off x="1070933" y="5135761"/>
-            <a:ext cx="1051650" cy="230832"/>
-          </a:xfrm>
-          <a:prstGeom prst="rect">
-            <a:avLst/>
-          </a:prstGeom>
-          <a:noFill/>
-        </p:spPr>
-        <p:txBody>
-          <a:bodyPr wrap="square" rtlCol="0">
-            <a:spAutoFit/>
-          </a:bodyPr>
-          <a:lstStyle/>
-          <a:p>
-            <a:pPr latinLnBrk="1"/>
-            <a:r>
-              <a:rPr kumimoji="1" lang="en-US" altLang="zh-TW" sz="900" i="1" dirty="0" smtClean="0">
+              </a:endParaRPr>
+            </a:p>
+          </p:txBody>
+        </p:sp>
+        <p:sp>
+          <p:nvSpPr>
+            <p:cNvPr id="117" name="文字方塊 116"/>
+            <p:cNvSpPr txBox="1"/>
+            <p:nvPr/>
+          </p:nvSpPr>
+          <p:spPr>
+            <a:xfrm>
+              <a:off x="1070933" y="5135761"/>
+              <a:ext cx="1051650" cy="230832"/>
+            </a:xfrm>
+            <a:prstGeom prst="rect">
+              <a:avLst/>
+            </a:prstGeom>
+            <a:noFill/>
+          </p:spPr>
+          <p:txBody>
+            <a:bodyPr wrap="square" rtlCol="0">
+              <a:spAutoFit/>
+            </a:bodyPr>
+            <a:lstStyle/>
+            <a:p>
+              <a:pPr latinLnBrk="1"/>
+              <a:r>
+                <a:rPr kumimoji="1" lang="en-US" altLang="zh-TW" sz="900" i="1" dirty="0" smtClean="0">
+                  <a:solidFill>
+                    <a:srgbClr val="943F43"/>
+                  </a:solidFill>
+                  <a:latin typeface="SFNS Display"/>
+                  <a:cs typeface="SFNS Display"/>
+                </a:rPr>
+                <a:t>Yorkshire Terrier</a:t>
+              </a:r>
+              <a:endParaRPr kumimoji="1" lang="zh-TW" altLang="en-US" sz="900" i="1" dirty="0">
                 <a:solidFill>
                   <a:srgbClr val="943F43"/>
                 </a:solidFill>
                 <a:latin typeface="SFNS Display"/>
                 <a:cs typeface="SFNS Display"/>
-              </a:rPr>
-              <a:t>Yorkshire Terrier</a:t>
-            </a:r>
-            <a:endParaRPr kumimoji="1" lang="zh-TW" altLang="en-US" sz="900" i="1" dirty="0">
-              <a:solidFill>
-                <a:srgbClr val="943F43"/>
-              </a:solidFill>
-              <a:latin typeface="SFNS Display"/>
-              <a:cs typeface="SFNS Display"/>
-            </a:endParaRPr>
-          </a:p>
-        </p:txBody>
-      </p:sp>
-      <p:sp>
-        <p:nvSpPr>
-          <p:cNvPr id="118" name="文字方塊 117"/>
-          <p:cNvSpPr txBox="1"/>
-          <p:nvPr/>
-        </p:nvSpPr>
-        <p:spPr>
-          <a:xfrm>
-            <a:off x="1070937" y="5344859"/>
-            <a:ext cx="2414531" cy="400110"/>
-          </a:xfrm>
-          <a:prstGeom prst="rect">
-            <a:avLst/>
-          </a:prstGeom>
-          <a:noFill/>
-        </p:spPr>
-        <p:txBody>
-          <a:bodyPr wrap="square" rtlCol="0">
-            <a:spAutoFit/>
-          </a:bodyPr>
-          <a:lstStyle/>
-          <a:p>
-            <a:r>
-              <a:rPr kumimoji="1" lang="en-US" altLang="zh-TW" sz="1000" dirty="0" smtClean="0">
+              </a:endParaRPr>
+            </a:p>
+          </p:txBody>
+        </p:sp>
+        <p:sp>
+          <p:nvSpPr>
+            <p:cNvPr id="118" name="文字方塊 117"/>
+            <p:cNvSpPr txBox="1"/>
+            <p:nvPr/>
+          </p:nvSpPr>
+          <p:spPr>
+            <a:xfrm>
+              <a:off x="1070937" y="5344859"/>
+              <a:ext cx="2414531" cy="400110"/>
+            </a:xfrm>
+            <a:prstGeom prst="rect">
+              <a:avLst/>
+            </a:prstGeom>
+            <a:noFill/>
+          </p:spPr>
+          <p:txBody>
+            <a:bodyPr wrap="square" rtlCol="0">
+              <a:spAutoFit/>
+            </a:bodyPr>
+            <a:lstStyle/>
+            <a:p>
+              <a:r>
+                <a:rPr kumimoji="1" lang="en-US" altLang="zh-TW" sz="1000" dirty="0" smtClean="0">
+                  <a:solidFill>
+                    <a:srgbClr val="666663"/>
+                  </a:solidFill>
+                  <a:latin typeface="SFNS Display"/>
+                  <a:cs typeface="SFNS Display"/>
+                </a:rPr>
+                <a:t>Check out this primer so you can meet and understand your dog’s needs.</a:t>
+              </a:r>
+              <a:endParaRPr kumimoji="1" lang="zh-TW" altLang="en-US" sz="1000" dirty="0">
                 <a:solidFill>
                   <a:srgbClr val="666663"/>
                 </a:solidFill>
                 <a:latin typeface="SFNS Display"/>
                 <a:cs typeface="SFNS Display"/>
-              </a:rPr>
-              <a:t>Check out this primer so you can meet and understand your dog’s needs.</a:t>
-            </a:r>
-            <a:endParaRPr kumimoji="1" lang="zh-TW" altLang="en-US" sz="1000" dirty="0">
-              <a:solidFill>
-                <a:srgbClr val="666663"/>
-              </a:solidFill>
-              <a:latin typeface="SFNS Display"/>
-              <a:cs typeface="SFNS Display"/>
-            </a:endParaRPr>
-          </a:p>
-        </p:txBody>
-      </p:sp>
-      <p:sp>
-        <p:nvSpPr>
-          <p:cNvPr id="119" name="文字方塊 118"/>
-          <p:cNvSpPr txBox="1"/>
+              </a:endParaRPr>
+            </a:p>
+          </p:txBody>
+        </p:sp>
+      </p:grpSp>
+      <p:grpSp>
+        <p:nvGrpSpPr>
+          <p:cNvPr id="6" name="群組 5"/>
+          <p:cNvGrpSpPr/>
           <p:nvPr/>
-        </p:nvSpPr>
-        <p:spPr>
+        </p:nvGrpSpPr>
+        <p:grpSpPr>
           <a:xfrm>
-            <a:off x="1076404" y="6006620"/>
-            <a:ext cx="944011" cy="307777"/>
+            <a:off x="127059" y="6006620"/>
+            <a:ext cx="3363876" cy="946192"/>
+            <a:chOff x="127059" y="6006620"/>
+            <a:chExt cx="3363876" cy="946192"/>
           </a:xfrm>
-          <a:prstGeom prst="rect">
-            <a:avLst/>
-          </a:prstGeom>
-          <a:noFill/>
-        </p:spPr>
-        <p:txBody>
-          <a:bodyPr wrap="square" rtlCol="0">
-            <a:spAutoFit/>
-          </a:bodyPr>
-          <a:lstStyle/>
-          <a:p>
-            <a:r>
-              <a:rPr kumimoji="1" lang="en-US" altLang="zh-TW" sz="1400" b="1" dirty="0" smtClean="0">
+        </p:grpSpPr>
+        <p:pic>
+          <p:nvPicPr>
+            <p:cNvPr id="75" name="圖片 74" descr="garden-dog-pet.jpg"/>
+            <p:cNvPicPr>
+              <a:picLocks noChangeAspect="1"/>
+            </p:cNvPicPr>
+            <p:nvPr/>
+          </p:nvPicPr>
+          <p:blipFill rotWithShape="1">
+            <a:blip r:embed="rId9" cstate="email">
+              <a:extLst>
+                <a:ext uri="{28A0092B-C50C-407E-A947-70E740481C1C}">
+                  <a14:useLocalDpi xmlns:a14="http://schemas.microsoft.com/office/drawing/2010/main"/>
+                </a:ext>
+              </a:extLst>
+            </a:blip>
+            <a:srcRect/>
+            <a:stretch/>
+          </p:blipFill>
+          <p:spPr>
+            <a:xfrm>
+              <a:off x="127059" y="6052812"/>
+              <a:ext cx="939348" cy="900000"/>
+            </a:xfrm>
+            <a:prstGeom prst="rect">
+              <a:avLst/>
+            </a:prstGeom>
+          </p:spPr>
+        </p:pic>
+        <p:sp>
+          <p:nvSpPr>
+            <p:cNvPr id="119" name="文字方塊 118"/>
+            <p:cNvSpPr txBox="1"/>
+            <p:nvPr/>
+          </p:nvSpPr>
+          <p:spPr>
+            <a:xfrm>
+              <a:off x="1076404" y="6006620"/>
+              <a:ext cx="944011" cy="307777"/>
+            </a:xfrm>
+            <a:prstGeom prst="rect">
+              <a:avLst/>
+            </a:prstGeom>
+            <a:noFill/>
+          </p:spPr>
+          <p:txBody>
+            <a:bodyPr wrap="square" rtlCol="0">
+              <a:spAutoFit/>
+            </a:bodyPr>
+            <a:lstStyle/>
+            <a:p>
+              <a:r>
+                <a:rPr kumimoji="1" lang="en-US" altLang="zh-TW" sz="1400" b="1" dirty="0" smtClean="0">
+                  <a:solidFill>
+                    <a:srgbClr val="663333"/>
+                  </a:solidFill>
+                  <a:latin typeface="SFNS Display"/>
+                  <a:cs typeface="SFNS Display"/>
+                </a:rPr>
+                <a:t>Myra</a:t>
+              </a:r>
+              <a:endParaRPr kumimoji="1" lang="zh-TW" altLang="en-US" sz="1400" b="1" dirty="0">
                 <a:solidFill>
                   <a:srgbClr val="663333"/>
                 </a:solidFill>
                 <a:latin typeface="SFNS Display"/>
                 <a:cs typeface="SFNS Display"/>
-              </a:rPr>
-              <a:t>Myra</a:t>
-            </a:r>
-            <a:endParaRPr kumimoji="1" lang="zh-TW" altLang="en-US" sz="1400" b="1" dirty="0">
-              <a:solidFill>
-                <a:srgbClr val="663333"/>
-              </a:solidFill>
-              <a:latin typeface="SFNS Display"/>
-              <a:cs typeface="SFNS Display"/>
-            </a:endParaRPr>
-          </a:p>
-        </p:txBody>
-      </p:sp>
-      <p:sp>
-        <p:nvSpPr>
-          <p:cNvPr id="120" name="文字方塊 119"/>
-          <p:cNvSpPr txBox="1"/>
-          <p:nvPr/>
-        </p:nvSpPr>
-        <p:spPr>
-          <a:xfrm>
-            <a:off x="1076400" y="6241640"/>
-            <a:ext cx="1051650" cy="230832"/>
-          </a:xfrm>
-          <a:prstGeom prst="rect">
-            <a:avLst/>
-          </a:prstGeom>
-          <a:noFill/>
-        </p:spPr>
-        <p:txBody>
-          <a:bodyPr wrap="square" rtlCol="0">
-            <a:spAutoFit/>
-          </a:bodyPr>
-          <a:lstStyle/>
-          <a:p>
-            <a:pPr latinLnBrk="1"/>
-            <a:r>
-              <a:rPr kumimoji="1" lang="en-US" altLang="zh-TW" sz="900" i="1" dirty="0" smtClean="0">
+              </a:endParaRPr>
+            </a:p>
+          </p:txBody>
+        </p:sp>
+        <p:sp>
+          <p:nvSpPr>
+            <p:cNvPr id="120" name="文字方塊 119"/>
+            <p:cNvSpPr txBox="1"/>
+            <p:nvPr/>
+          </p:nvSpPr>
+          <p:spPr>
+            <a:xfrm>
+              <a:off x="1076400" y="6241640"/>
+              <a:ext cx="1051650" cy="230832"/>
+            </a:xfrm>
+            <a:prstGeom prst="rect">
+              <a:avLst/>
+            </a:prstGeom>
+            <a:noFill/>
+          </p:spPr>
+          <p:txBody>
+            <a:bodyPr wrap="square" rtlCol="0">
+              <a:spAutoFit/>
+            </a:bodyPr>
+            <a:lstStyle/>
+            <a:p>
+              <a:pPr latinLnBrk="1"/>
+              <a:r>
+                <a:rPr kumimoji="1" lang="en-US" altLang="zh-TW" sz="900" i="1" dirty="0" smtClean="0">
+                  <a:solidFill>
+                    <a:srgbClr val="943F43"/>
+                  </a:solidFill>
+                  <a:latin typeface="SFNS Display"/>
+                  <a:cs typeface="SFNS Display"/>
+                </a:rPr>
+                <a:t>Yorkshire Terrier</a:t>
+              </a:r>
+              <a:endParaRPr kumimoji="1" lang="zh-TW" altLang="en-US" sz="900" i="1" dirty="0">
                 <a:solidFill>
                   <a:srgbClr val="943F43"/>
                 </a:solidFill>
                 <a:latin typeface="SFNS Display"/>
                 <a:cs typeface="SFNS Display"/>
-              </a:rPr>
-              <a:t>Yorkshire Terrier</a:t>
-            </a:r>
-            <a:endParaRPr kumimoji="1" lang="zh-TW" altLang="en-US" sz="900" i="1" dirty="0">
-              <a:solidFill>
-                <a:srgbClr val="943F43"/>
-              </a:solidFill>
-              <a:latin typeface="SFNS Display"/>
-              <a:cs typeface="SFNS Display"/>
-            </a:endParaRPr>
-          </a:p>
-        </p:txBody>
-      </p:sp>
-      <p:sp>
-        <p:nvSpPr>
-          <p:cNvPr id="121" name="文字方塊 120"/>
-          <p:cNvSpPr txBox="1"/>
-          <p:nvPr/>
-        </p:nvSpPr>
-        <p:spPr>
-          <a:xfrm>
-            <a:off x="1076404" y="6450738"/>
-            <a:ext cx="2414531" cy="400110"/>
-          </a:xfrm>
-          <a:prstGeom prst="rect">
-            <a:avLst/>
-          </a:prstGeom>
-          <a:noFill/>
-        </p:spPr>
-        <p:txBody>
-          <a:bodyPr wrap="square" rtlCol="0">
-            <a:spAutoFit/>
-          </a:bodyPr>
-          <a:lstStyle/>
-          <a:p>
-            <a:r>
-              <a:rPr kumimoji="1" lang="en-US" altLang="zh-TW" sz="1000" dirty="0" smtClean="0">
+              </a:endParaRPr>
+            </a:p>
+          </p:txBody>
+        </p:sp>
+        <p:sp>
+          <p:nvSpPr>
+            <p:cNvPr id="121" name="文字方塊 120"/>
+            <p:cNvSpPr txBox="1"/>
+            <p:nvPr/>
+          </p:nvSpPr>
+          <p:spPr>
+            <a:xfrm>
+              <a:off x="1076404" y="6450738"/>
+              <a:ext cx="2414531" cy="400110"/>
+            </a:xfrm>
+            <a:prstGeom prst="rect">
+              <a:avLst/>
+            </a:prstGeom>
+            <a:noFill/>
+          </p:spPr>
+          <p:txBody>
+            <a:bodyPr wrap="square" rtlCol="0">
+              <a:spAutoFit/>
+            </a:bodyPr>
+            <a:lstStyle/>
+            <a:p>
+              <a:r>
+                <a:rPr kumimoji="1" lang="en-US" altLang="zh-TW" sz="1000" dirty="0" smtClean="0">
+                  <a:solidFill>
+                    <a:srgbClr val="666663"/>
+                  </a:solidFill>
+                  <a:latin typeface="SFNS Display"/>
+                  <a:cs typeface="SFNS Display"/>
+                </a:rPr>
+                <a:t>Check out this primer so you can meet and understand your dog’s needs.</a:t>
+              </a:r>
+              <a:endParaRPr kumimoji="1" lang="zh-TW" altLang="en-US" sz="1000" dirty="0">
                 <a:solidFill>
                   <a:srgbClr val="666663"/>
                 </a:solidFill>
                 <a:latin typeface="SFNS Display"/>
                 <a:cs typeface="SFNS Display"/>
-              </a:rPr>
-              <a:t>Check out this primer so you can meet and understand your dog’s needs.</a:t>
-            </a:r>
-            <a:endParaRPr kumimoji="1" lang="zh-TW" altLang="en-US" sz="1000" dirty="0">
-              <a:solidFill>
-                <a:srgbClr val="666663"/>
-              </a:solidFill>
-              <a:latin typeface="SFNS Display"/>
-              <a:cs typeface="SFNS Display"/>
-            </a:endParaRPr>
-          </a:p>
-        </p:txBody>
-      </p:sp>
+              </a:endParaRPr>
+            </a:p>
+          </p:txBody>
+        </p:sp>
+      </p:grpSp>
       <p:sp>
         <p:nvSpPr>
           <p:cNvPr id="122" name="矩形 121"/>

</xml_diff>